<commit_message>
Update test to use decimals
</commit_message>
<xml_diff>
--- a/doc/test/SyncLab/SyncLab_SoftEdgeEffect.pptx
+++ b/doc/test/SyncLab/SyncLab_SoftEdgeEffect.pptx
@@ -105,7 +105,16 @@
       </a:defRPr>
     </a:lvl9pPr>
   </p:defaultTextStyle>
+  <p:extLst>
+    <p:ext uri="{EFAFB233-063F-42B5-8137-9DF3F51BA10A}">
+      <p15:sldGuideLst xmlns:p15="http://schemas.microsoft.com/office/powerpoint/2012/main"/>
+    </p:ext>
+  </p:extLst>
 </p:presentation>
+</file>
+
+<file path=ppt/revisionInfo.xml><?xml version="1.0" encoding="utf-8"?>
+<p1510:revInfo xmlns:a="http://schemas.openxmlformats.org/drawingml/2006/main" xmlns:r="http://schemas.openxmlformats.org/officeDocument/2006/relationships" xmlns:p1510="http://schemas.microsoft.com/office/powerpoint/2015/10/main"/>
 </file>
 
 <file path=ppt/slideLayouts/slideLayout1.xml><?xml version="1.0" encoding="utf-8"?>
@@ -150,10 +159,9 @@
           </a:lstStyle>
           <a:p>
             <a:r>
-              <a:rPr lang="en-US" smtClean="0"/>
+              <a:rPr lang="en-US"/>
               <a:t>Click to edit Master title style</a:t>
             </a:r>
-            <a:endParaRPr lang="en-US"/>
           </a:p>
         </p:txBody>
       </p:sp>
@@ -215,10 +223,9 @@
           </a:lstStyle>
           <a:p>
             <a:r>
-              <a:rPr lang="en-US" smtClean="0"/>
+              <a:rPr lang="en-US"/>
               <a:t>Click to edit Master subtitle style</a:t>
             </a:r>
-            <a:endParaRPr lang="en-US"/>
           </a:p>
         </p:txBody>
       </p:sp>
@@ -239,7 +246,7 @@
           <a:p>
             <a:fld id="{4C46FA45-9E29-4EF2-990D-001CC6035AA3}" type="datetimeFigureOut">
               <a:rPr lang="en-US" smtClean="0"/>
-              <a:t>4/3/2018</a:t>
+              <a:t>4/11/2018</a:t>
             </a:fld>
             <a:endParaRPr lang="en-US"/>
           </a:p>
@@ -333,10 +340,9 @@
           <a:lstStyle/>
           <a:p>
             <a:r>
-              <a:rPr lang="en-US" smtClean="0"/>
+              <a:rPr lang="en-US"/>
               <a:t>Click to edit Master title style</a:t>
             </a:r>
-            <a:endParaRPr lang="en-US"/>
           </a:p>
         </p:txBody>
       </p:sp>
@@ -357,38 +363,37 @@
           <a:p>
             <a:pPr lvl="0"/>
             <a:r>
-              <a:rPr lang="en-US" smtClean="0"/>
+              <a:rPr lang="en-US"/>
               <a:t>Click to edit Master text styles</a:t>
             </a:r>
           </a:p>
           <a:p>
             <a:pPr lvl="1"/>
             <a:r>
-              <a:rPr lang="en-US" smtClean="0"/>
+              <a:rPr lang="en-US"/>
               <a:t>Second level</a:t>
             </a:r>
           </a:p>
           <a:p>
             <a:pPr lvl="2"/>
             <a:r>
-              <a:rPr lang="en-US" smtClean="0"/>
+              <a:rPr lang="en-US"/>
               <a:t>Third level</a:t>
             </a:r>
           </a:p>
           <a:p>
             <a:pPr lvl="3"/>
             <a:r>
-              <a:rPr lang="en-US" smtClean="0"/>
+              <a:rPr lang="en-US"/>
               <a:t>Fourth level</a:t>
             </a:r>
           </a:p>
           <a:p>
             <a:pPr lvl="4"/>
             <a:r>
-              <a:rPr lang="en-US" smtClean="0"/>
+              <a:rPr lang="en-US"/>
               <a:t>Fifth level</a:t>
             </a:r>
-            <a:endParaRPr lang="en-US"/>
           </a:p>
         </p:txBody>
       </p:sp>
@@ -409,7 +414,7 @@
           <a:p>
             <a:fld id="{4C46FA45-9E29-4EF2-990D-001CC6035AA3}" type="datetimeFigureOut">
               <a:rPr lang="en-US" smtClean="0"/>
-              <a:t>4/3/2018</a:t>
+              <a:t>4/11/2018</a:t>
             </a:fld>
             <a:endParaRPr lang="en-US"/>
           </a:p>
@@ -508,10 +513,9 @@
           <a:lstStyle/>
           <a:p>
             <a:r>
-              <a:rPr lang="en-US" smtClean="0"/>
+              <a:rPr lang="en-US"/>
               <a:t>Click to edit Master title style</a:t>
             </a:r>
-            <a:endParaRPr lang="en-US"/>
           </a:p>
         </p:txBody>
       </p:sp>
@@ -537,38 +541,37 @@
           <a:p>
             <a:pPr lvl="0"/>
             <a:r>
-              <a:rPr lang="en-US" smtClean="0"/>
+              <a:rPr lang="en-US"/>
               <a:t>Click to edit Master text styles</a:t>
             </a:r>
           </a:p>
           <a:p>
             <a:pPr lvl="1"/>
             <a:r>
-              <a:rPr lang="en-US" smtClean="0"/>
+              <a:rPr lang="en-US"/>
               <a:t>Second level</a:t>
             </a:r>
           </a:p>
           <a:p>
             <a:pPr lvl="2"/>
             <a:r>
-              <a:rPr lang="en-US" smtClean="0"/>
+              <a:rPr lang="en-US"/>
               <a:t>Third level</a:t>
             </a:r>
           </a:p>
           <a:p>
             <a:pPr lvl="3"/>
             <a:r>
-              <a:rPr lang="en-US" smtClean="0"/>
+              <a:rPr lang="en-US"/>
               <a:t>Fourth level</a:t>
             </a:r>
           </a:p>
           <a:p>
             <a:pPr lvl="4"/>
             <a:r>
-              <a:rPr lang="en-US" smtClean="0"/>
+              <a:rPr lang="en-US"/>
               <a:t>Fifth level</a:t>
             </a:r>
-            <a:endParaRPr lang="en-US"/>
           </a:p>
         </p:txBody>
       </p:sp>
@@ -589,7 +592,7 @@
           <a:p>
             <a:fld id="{4C46FA45-9E29-4EF2-990D-001CC6035AA3}" type="datetimeFigureOut">
               <a:rPr lang="en-US" smtClean="0"/>
-              <a:t>4/3/2018</a:t>
+              <a:t>4/11/2018</a:t>
             </a:fld>
             <a:endParaRPr lang="en-US"/>
           </a:p>
@@ -683,10 +686,9 @@
           <a:lstStyle/>
           <a:p>
             <a:r>
-              <a:rPr lang="en-US" smtClean="0"/>
+              <a:rPr lang="en-US"/>
               <a:t>Click to edit Master title style</a:t>
             </a:r>
-            <a:endParaRPr lang="en-US"/>
           </a:p>
         </p:txBody>
       </p:sp>
@@ -707,38 +709,37 @@
           <a:p>
             <a:pPr lvl="0"/>
             <a:r>
-              <a:rPr lang="en-US" smtClean="0"/>
+              <a:rPr lang="en-US"/>
               <a:t>Click to edit Master text styles</a:t>
             </a:r>
           </a:p>
           <a:p>
             <a:pPr lvl="1"/>
             <a:r>
-              <a:rPr lang="en-US" smtClean="0"/>
+              <a:rPr lang="en-US"/>
               <a:t>Second level</a:t>
             </a:r>
           </a:p>
           <a:p>
             <a:pPr lvl="2"/>
             <a:r>
-              <a:rPr lang="en-US" smtClean="0"/>
+              <a:rPr lang="en-US"/>
               <a:t>Third level</a:t>
             </a:r>
           </a:p>
           <a:p>
             <a:pPr lvl="3"/>
             <a:r>
-              <a:rPr lang="en-US" smtClean="0"/>
+              <a:rPr lang="en-US"/>
               <a:t>Fourth level</a:t>
             </a:r>
           </a:p>
           <a:p>
             <a:pPr lvl="4"/>
             <a:r>
-              <a:rPr lang="en-US" smtClean="0"/>
+              <a:rPr lang="en-US"/>
               <a:t>Fifth level</a:t>
             </a:r>
-            <a:endParaRPr lang="en-US"/>
           </a:p>
         </p:txBody>
       </p:sp>
@@ -759,7 +760,7 @@
           <a:p>
             <a:fld id="{4C46FA45-9E29-4EF2-990D-001CC6035AA3}" type="datetimeFigureOut">
               <a:rPr lang="en-US" smtClean="0"/>
-              <a:t>4/3/2018</a:t>
+              <a:t>4/11/2018</a:t>
             </a:fld>
             <a:endParaRPr lang="en-US"/>
           </a:p>
@@ -862,10 +863,9 @@
           </a:lstStyle>
           <a:p>
             <a:r>
-              <a:rPr lang="en-US" smtClean="0"/>
+              <a:rPr lang="en-US"/>
               <a:t>Click to edit Master title style</a:t>
             </a:r>
-            <a:endParaRPr lang="en-US"/>
           </a:p>
         </p:txBody>
       </p:sp>
@@ -982,7 +982,7 @@
           <a:p>
             <a:pPr lvl="0"/>
             <a:r>
-              <a:rPr lang="en-US" smtClean="0"/>
+              <a:rPr lang="en-US"/>
               <a:t>Click to edit Master text styles</a:t>
             </a:r>
           </a:p>
@@ -1005,7 +1005,7 @@
           <a:p>
             <a:fld id="{4C46FA45-9E29-4EF2-990D-001CC6035AA3}" type="datetimeFigureOut">
               <a:rPr lang="en-US" smtClean="0"/>
-              <a:t>4/3/2018</a:t>
+              <a:t>4/11/2018</a:t>
             </a:fld>
             <a:endParaRPr lang="en-US"/>
           </a:p>
@@ -1099,10 +1099,9 @@
           <a:lstStyle/>
           <a:p>
             <a:r>
-              <a:rPr lang="en-US" smtClean="0"/>
+              <a:rPr lang="en-US"/>
               <a:t>Click to edit Master title style</a:t>
             </a:r>
-            <a:endParaRPr lang="en-US"/>
           </a:p>
         </p:txBody>
       </p:sp>
@@ -1128,38 +1127,37 @@
           <a:p>
             <a:pPr lvl="0"/>
             <a:r>
-              <a:rPr lang="en-US" smtClean="0"/>
+              <a:rPr lang="en-US"/>
               <a:t>Click to edit Master text styles</a:t>
             </a:r>
           </a:p>
           <a:p>
             <a:pPr lvl="1"/>
             <a:r>
-              <a:rPr lang="en-US" smtClean="0"/>
+              <a:rPr lang="en-US"/>
               <a:t>Second level</a:t>
             </a:r>
           </a:p>
           <a:p>
             <a:pPr lvl="2"/>
             <a:r>
-              <a:rPr lang="en-US" smtClean="0"/>
+              <a:rPr lang="en-US"/>
               <a:t>Third level</a:t>
             </a:r>
           </a:p>
           <a:p>
             <a:pPr lvl="3"/>
             <a:r>
-              <a:rPr lang="en-US" smtClean="0"/>
+              <a:rPr lang="en-US"/>
               <a:t>Fourth level</a:t>
             </a:r>
           </a:p>
           <a:p>
             <a:pPr lvl="4"/>
             <a:r>
-              <a:rPr lang="en-US" smtClean="0"/>
+              <a:rPr lang="en-US"/>
               <a:t>Fifth level</a:t>
             </a:r>
-            <a:endParaRPr lang="en-US"/>
           </a:p>
         </p:txBody>
       </p:sp>
@@ -1185,38 +1183,37 @@
           <a:p>
             <a:pPr lvl="0"/>
             <a:r>
-              <a:rPr lang="en-US" smtClean="0"/>
+              <a:rPr lang="en-US"/>
               <a:t>Click to edit Master text styles</a:t>
             </a:r>
           </a:p>
           <a:p>
             <a:pPr lvl="1"/>
             <a:r>
-              <a:rPr lang="en-US" smtClean="0"/>
+              <a:rPr lang="en-US"/>
               <a:t>Second level</a:t>
             </a:r>
           </a:p>
           <a:p>
             <a:pPr lvl="2"/>
             <a:r>
-              <a:rPr lang="en-US" smtClean="0"/>
+              <a:rPr lang="en-US"/>
               <a:t>Third level</a:t>
             </a:r>
           </a:p>
           <a:p>
             <a:pPr lvl="3"/>
             <a:r>
-              <a:rPr lang="en-US" smtClean="0"/>
+              <a:rPr lang="en-US"/>
               <a:t>Fourth level</a:t>
             </a:r>
           </a:p>
           <a:p>
             <a:pPr lvl="4"/>
             <a:r>
-              <a:rPr lang="en-US" smtClean="0"/>
+              <a:rPr lang="en-US"/>
               <a:t>Fifth level</a:t>
             </a:r>
-            <a:endParaRPr lang="en-US"/>
           </a:p>
         </p:txBody>
       </p:sp>
@@ -1237,7 +1234,7 @@
           <a:p>
             <a:fld id="{4C46FA45-9E29-4EF2-990D-001CC6035AA3}" type="datetimeFigureOut">
               <a:rPr lang="en-US" smtClean="0"/>
-              <a:t>4/3/2018</a:t>
+              <a:t>4/11/2018</a:t>
             </a:fld>
             <a:endParaRPr lang="en-US"/>
           </a:p>
@@ -1336,10 +1333,9 @@
           <a:lstStyle/>
           <a:p>
             <a:r>
-              <a:rPr lang="en-US" smtClean="0"/>
+              <a:rPr lang="en-US"/>
               <a:t>Click to edit Master title style</a:t>
             </a:r>
-            <a:endParaRPr lang="en-US"/>
           </a:p>
         </p:txBody>
       </p:sp>
@@ -1402,7 +1398,7 @@
           <a:p>
             <a:pPr lvl="0"/>
             <a:r>
-              <a:rPr lang="en-US" smtClean="0"/>
+              <a:rPr lang="en-US"/>
               <a:t>Click to edit Master text styles</a:t>
             </a:r>
           </a:p>
@@ -1430,38 +1426,37 @@
           <a:p>
             <a:pPr lvl="0"/>
             <a:r>
-              <a:rPr lang="en-US" smtClean="0"/>
+              <a:rPr lang="en-US"/>
               <a:t>Click to edit Master text styles</a:t>
             </a:r>
           </a:p>
           <a:p>
             <a:pPr lvl="1"/>
             <a:r>
-              <a:rPr lang="en-US" smtClean="0"/>
+              <a:rPr lang="en-US"/>
               <a:t>Second level</a:t>
             </a:r>
           </a:p>
           <a:p>
             <a:pPr lvl="2"/>
             <a:r>
-              <a:rPr lang="en-US" smtClean="0"/>
+              <a:rPr lang="en-US"/>
               <a:t>Third level</a:t>
             </a:r>
           </a:p>
           <a:p>
             <a:pPr lvl="3"/>
             <a:r>
-              <a:rPr lang="en-US" smtClean="0"/>
+              <a:rPr lang="en-US"/>
               <a:t>Fourth level</a:t>
             </a:r>
           </a:p>
           <a:p>
             <a:pPr lvl="4"/>
             <a:r>
-              <a:rPr lang="en-US" smtClean="0"/>
+              <a:rPr lang="en-US"/>
               <a:t>Fifth level</a:t>
             </a:r>
-            <a:endParaRPr lang="en-US"/>
           </a:p>
         </p:txBody>
       </p:sp>
@@ -1524,7 +1519,7 @@
           <a:p>
             <a:pPr lvl="0"/>
             <a:r>
-              <a:rPr lang="en-US" smtClean="0"/>
+              <a:rPr lang="en-US"/>
               <a:t>Click to edit Master text styles</a:t>
             </a:r>
           </a:p>
@@ -1552,38 +1547,37 @@
           <a:p>
             <a:pPr lvl="0"/>
             <a:r>
-              <a:rPr lang="en-US" smtClean="0"/>
+              <a:rPr lang="en-US"/>
               <a:t>Click to edit Master text styles</a:t>
             </a:r>
           </a:p>
           <a:p>
             <a:pPr lvl="1"/>
             <a:r>
-              <a:rPr lang="en-US" smtClean="0"/>
+              <a:rPr lang="en-US"/>
               <a:t>Second level</a:t>
             </a:r>
           </a:p>
           <a:p>
             <a:pPr lvl="2"/>
             <a:r>
-              <a:rPr lang="en-US" smtClean="0"/>
+              <a:rPr lang="en-US"/>
               <a:t>Third level</a:t>
             </a:r>
           </a:p>
           <a:p>
             <a:pPr lvl="3"/>
             <a:r>
-              <a:rPr lang="en-US" smtClean="0"/>
+              <a:rPr lang="en-US"/>
               <a:t>Fourth level</a:t>
             </a:r>
           </a:p>
           <a:p>
             <a:pPr lvl="4"/>
             <a:r>
-              <a:rPr lang="en-US" smtClean="0"/>
+              <a:rPr lang="en-US"/>
               <a:t>Fifth level</a:t>
             </a:r>
-            <a:endParaRPr lang="en-US"/>
           </a:p>
         </p:txBody>
       </p:sp>
@@ -1604,7 +1598,7 @@
           <a:p>
             <a:fld id="{4C46FA45-9E29-4EF2-990D-001CC6035AA3}" type="datetimeFigureOut">
               <a:rPr lang="en-US" smtClean="0"/>
-              <a:t>4/3/2018</a:t>
+              <a:t>4/11/2018</a:t>
             </a:fld>
             <a:endParaRPr lang="en-US"/>
           </a:p>
@@ -1698,10 +1692,9 @@
           <a:lstStyle/>
           <a:p>
             <a:r>
-              <a:rPr lang="en-US" smtClean="0"/>
+              <a:rPr lang="en-US"/>
               <a:t>Click to edit Master title style</a:t>
             </a:r>
-            <a:endParaRPr lang="en-US"/>
           </a:p>
         </p:txBody>
       </p:sp>
@@ -1722,7 +1715,7 @@
           <a:p>
             <a:fld id="{4C46FA45-9E29-4EF2-990D-001CC6035AA3}" type="datetimeFigureOut">
               <a:rPr lang="en-US" smtClean="0"/>
-              <a:t>4/3/2018</a:t>
+              <a:t>4/11/2018</a:t>
             </a:fld>
             <a:endParaRPr lang="en-US"/>
           </a:p>
@@ -1817,7 +1810,7 @@
           <a:p>
             <a:fld id="{4C46FA45-9E29-4EF2-990D-001CC6035AA3}" type="datetimeFigureOut">
               <a:rPr lang="en-US" smtClean="0"/>
-              <a:t>4/3/2018</a:t>
+              <a:t>4/11/2018</a:t>
             </a:fld>
             <a:endParaRPr lang="en-US"/>
           </a:p>
@@ -1920,10 +1913,9 @@
           </a:lstStyle>
           <a:p>
             <a:r>
-              <a:rPr lang="en-US" smtClean="0"/>
+              <a:rPr lang="en-US"/>
               <a:t>Click to edit Master title style</a:t>
             </a:r>
-            <a:endParaRPr lang="en-US"/>
           </a:p>
         </p:txBody>
       </p:sp>
@@ -1977,38 +1969,37 @@
           <a:p>
             <a:pPr lvl="0"/>
             <a:r>
-              <a:rPr lang="en-US" smtClean="0"/>
+              <a:rPr lang="en-US"/>
               <a:t>Click to edit Master text styles</a:t>
             </a:r>
           </a:p>
           <a:p>
             <a:pPr lvl="1"/>
             <a:r>
-              <a:rPr lang="en-US" smtClean="0"/>
+              <a:rPr lang="en-US"/>
               <a:t>Second level</a:t>
             </a:r>
           </a:p>
           <a:p>
             <a:pPr lvl="2"/>
             <a:r>
-              <a:rPr lang="en-US" smtClean="0"/>
+              <a:rPr lang="en-US"/>
               <a:t>Third level</a:t>
             </a:r>
           </a:p>
           <a:p>
             <a:pPr lvl="3"/>
             <a:r>
-              <a:rPr lang="en-US" smtClean="0"/>
+              <a:rPr lang="en-US"/>
               <a:t>Fourth level</a:t>
             </a:r>
           </a:p>
           <a:p>
             <a:pPr lvl="4"/>
             <a:r>
-              <a:rPr lang="en-US" smtClean="0"/>
+              <a:rPr lang="en-US"/>
               <a:t>Fifth level</a:t>
             </a:r>
-            <a:endParaRPr lang="en-US"/>
           </a:p>
         </p:txBody>
       </p:sp>
@@ -2071,7 +2062,7 @@
           <a:p>
             <a:pPr lvl="0"/>
             <a:r>
-              <a:rPr lang="en-US" smtClean="0"/>
+              <a:rPr lang="en-US"/>
               <a:t>Click to edit Master text styles</a:t>
             </a:r>
           </a:p>
@@ -2094,7 +2085,7 @@
           <a:p>
             <a:fld id="{4C46FA45-9E29-4EF2-990D-001CC6035AA3}" type="datetimeFigureOut">
               <a:rPr lang="en-US" smtClean="0"/>
-              <a:t>4/3/2018</a:t>
+              <a:t>4/11/2018</a:t>
             </a:fld>
             <a:endParaRPr lang="en-US"/>
           </a:p>
@@ -2197,10 +2188,9 @@
           </a:lstStyle>
           <a:p>
             <a:r>
-              <a:rPr lang="en-US" smtClean="0"/>
+              <a:rPr lang="en-US"/>
               <a:t>Click to edit Master title style</a:t>
             </a:r>
-            <a:endParaRPr lang="en-US"/>
           </a:p>
         </p:txBody>
       </p:sp>
@@ -2324,7 +2314,7 @@
           <a:p>
             <a:pPr lvl="0"/>
             <a:r>
-              <a:rPr lang="en-US" smtClean="0"/>
+              <a:rPr lang="en-US"/>
               <a:t>Click to edit Master text styles</a:t>
             </a:r>
           </a:p>
@@ -2347,7 +2337,7 @@
           <a:p>
             <a:fld id="{4C46FA45-9E29-4EF2-990D-001CC6035AA3}" type="datetimeFigureOut">
               <a:rPr lang="en-US" smtClean="0"/>
-              <a:t>4/3/2018</a:t>
+              <a:t>4/11/2018</a:t>
             </a:fld>
             <a:endParaRPr lang="en-US"/>
           </a:p>
@@ -2456,10 +2446,9 @@
           <a:lstStyle/>
           <a:p>
             <a:r>
-              <a:rPr lang="en-US" smtClean="0"/>
+              <a:rPr lang="en-US"/>
               <a:t>Click to edit Master title style</a:t>
             </a:r>
-            <a:endParaRPr lang="en-US"/>
           </a:p>
         </p:txBody>
       </p:sp>
@@ -2490,38 +2479,37 @@
           <a:p>
             <a:pPr lvl="0"/>
             <a:r>
-              <a:rPr lang="en-US" smtClean="0"/>
+              <a:rPr lang="en-US"/>
               <a:t>Click to edit Master text styles</a:t>
             </a:r>
           </a:p>
           <a:p>
             <a:pPr lvl="1"/>
             <a:r>
-              <a:rPr lang="en-US" smtClean="0"/>
+              <a:rPr lang="en-US"/>
               <a:t>Second level</a:t>
             </a:r>
           </a:p>
           <a:p>
             <a:pPr lvl="2"/>
             <a:r>
-              <a:rPr lang="en-US" smtClean="0"/>
+              <a:rPr lang="en-US"/>
               <a:t>Third level</a:t>
             </a:r>
           </a:p>
           <a:p>
             <a:pPr lvl="3"/>
             <a:r>
-              <a:rPr lang="en-US" smtClean="0"/>
+              <a:rPr lang="en-US"/>
               <a:t>Fourth level</a:t>
             </a:r>
           </a:p>
           <a:p>
             <a:pPr lvl="4"/>
             <a:r>
-              <a:rPr lang="en-US" smtClean="0"/>
+              <a:rPr lang="en-US"/>
               <a:t>Fifth level</a:t>
             </a:r>
-            <a:endParaRPr lang="en-US"/>
           </a:p>
         </p:txBody>
       </p:sp>
@@ -2560,7 +2548,7 @@
           <a:p>
             <a:fld id="{4C46FA45-9E29-4EF2-990D-001CC6035AA3}" type="datetimeFigureOut">
               <a:rPr lang="en-US" smtClean="0"/>
-              <a:t>4/3/2018</a:t>
+              <a:t>4/11/2018</a:t>
             </a:fld>
             <a:endParaRPr lang="en-US"/>
           </a:p>
@@ -2979,8 +2967,20 @@
           <a:prstGeom prst="rect">
             <a:avLst/>
           </a:prstGeom>
+          <a:solidFill>
+            <a:schemeClr val="accent1"/>
+          </a:solidFill>
+          <a:ln w="12700" cap="flat" cmpd="sng" algn="ctr">
+            <a:solidFill>
+              <a:srgbClr val="41719C"/>
+            </a:solidFill>
+            <a:prstDash val="solid"/>
+            <a:miter lim="800000"/>
+            <a:headEnd type="none" w="med" len="med"/>
+            <a:tailEnd type="none" w="med" len="med"/>
+          </a:ln>
           <a:effectLst>
-            <a:softEdge rad="127000"/>
+            <a:softEdge rad="383921"/>
           </a:effectLst>
         </p:spPr>
         <p:style>
@@ -3004,7 +3004,9 @@
           <a:lstStyle/>
           <a:p>
             <a:pPr algn="ctr"/>
-            <a:endParaRPr lang="en-US"/>
+            <a:endParaRPr lang="en-US" dirty="0">
+              <a:latin typeface="Calibri" panose="020F0502020204030204" pitchFamily="34" charset="0"/>
+            </a:endParaRPr>
           </a:p>
         </p:txBody>
       </p:sp>
@@ -3022,6 +3024,9 @@
           <a:prstGeom prst="triangle">
             <a:avLst/>
           </a:prstGeom>
+          <a:effectLst>
+            <a:softEdge rad="0"/>
+          </a:effectLst>
         </p:spPr>
         <p:style>
           <a:lnRef idx="2">
@@ -3092,8 +3097,20 @@
           <a:prstGeom prst="rect">
             <a:avLst/>
           </a:prstGeom>
+          <a:solidFill>
+            <a:schemeClr val="accent1"/>
+          </a:solidFill>
+          <a:ln w="12700" cap="flat" cmpd="sng" algn="ctr">
+            <a:solidFill>
+              <a:srgbClr val="41719C"/>
+            </a:solidFill>
+            <a:prstDash val="solid"/>
+            <a:miter lim="800000"/>
+            <a:headEnd type="none" w="med" len="med"/>
+            <a:tailEnd type="none" w="med" len="med"/>
+          </a:ln>
           <a:effectLst>
-            <a:softEdge rad="127000"/>
+            <a:softEdge rad="383921"/>
           </a:effectLst>
         </p:spPr>
         <p:style>
@@ -3117,7 +3134,9 @@
           <a:lstStyle/>
           <a:p>
             <a:pPr algn="ctr"/>
-            <a:endParaRPr lang="en-US"/>
+            <a:endParaRPr lang="en-US" dirty="0">
+              <a:latin typeface="Calibri" panose="020F0502020204030204" pitchFamily="34" charset="0"/>
+            </a:endParaRPr>
           </a:p>
         </p:txBody>
       </p:sp>
@@ -3135,6 +3154,9 @@
           <a:prstGeom prst="triangle">
             <a:avLst/>
           </a:prstGeom>
+          <a:effectLst>
+            <a:softEdge rad="383921"/>
+          </a:effectLst>
         </p:spPr>
         <p:style>
           <a:lnRef idx="2">
@@ -3164,7 +3186,7 @@
     </p:spTree>
     <p:extLst>
       <p:ext uri="{BB962C8B-B14F-4D97-AF65-F5344CB8AC3E}">
-        <p14:creationId xmlns:p14="http://schemas.microsoft.com/office/powerpoint/2010/main" val="2696022143"/>
+        <p14:creationId xmlns:p14="http://schemas.microsoft.com/office/powerpoint/2010/main" val="1791484441"/>
       </p:ext>
     </p:extLst>
   </p:cSld>

</xml_diff>